<commit_message>
Site updated: 2024-05-24 16:17:33
</commit_message>
<xml_diff>
--- a/ppt/mentalhealth/202312180.pptx
+++ b/ppt/mentalhealth/202312180.pptx
@@ -1334,178 +1334,49 @@
           </a:p>
         </p:txBody>
       </p:sp>
-      <p:grpSp>
-        <p:nvGrpSpPr>
-          <p:cNvPr id="18" name="组合 17">
-            <a:extLst>
-              <a:ext uri="{FF2B5EF4-FFF2-40B4-BE49-F238E27FC236}">
-                <a16:creationId xmlns:a16="http://schemas.microsoft.com/office/drawing/2014/main" id="{92B8D15E-6D50-4949-A315-6132F7550089}"/>
-              </a:ext>
-            </a:extLst>
-          </p:cNvPr>
-          <p:cNvGrpSpPr/>
+      <p:sp>
+        <p:nvSpPr>
+          <p:cNvPr id="9" name="Text 6"/>
+          <p:cNvSpPr/>
           <p:nvPr/>
-        </p:nvGrpSpPr>
-        <p:grpSpPr>
+        </p:nvSpPr>
+        <p:spPr>
           <a:xfrm>
-            <a:off x="7019478" y="5958840"/>
-            <a:ext cx="4134299" cy="1293495"/>
-            <a:chOff x="10146380" y="6456350"/>
-            <a:chExt cx="4340020" cy="1135813"/>
+            <a:off x="7475873" y="5958840"/>
+            <a:ext cx="3677904" cy="1293495"/>
           </a:xfrm>
-        </p:grpSpPr>
-        <p:sp>
-          <p:nvSpPr>
-            <p:cNvPr id="7" name="Shape 4"/>
-            <p:cNvSpPr/>
-            <p:nvPr/>
-          </p:nvSpPr>
-          <p:spPr>
-            <a:xfrm>
-              <a:off x="10146380" y="6702248"/>
-              <a:ext cx="323493" cy="323493"/>
-            </a:xfrm>
-            <a:prstGeom prst="roundRect">
-              <a:avLst>
-                <a:gd name="adj" fmla="val 28263627"/>
-              </a:avLst>
-            </a:prstGeom>
-            <a:solidFill>
-              <a:srgbClr val="BA18DE"/>
-            </a:solidFill>
-            <a:ln w="7620">
-              <a:solidFill>
-                <a:srgbClr val="FFFFFF"/>
-              </a:solidFill>
-              <a:prstDash val="solid"/>
-            </a:ln>
-          </p:spPr>
-          <p:txBody>
-            <a:bodyPr/>
-            <a:lstStyle/>
-            <a:p>
-              <a:endParaRPr lang="zh-CN" altLang="en-US" dirty="0"/>
-            </a:p>
-          </p:txBody>
-        </p:sp>
-        <p:sp>
-          <p:nvSpPr>
-            <p:cNvPr id="9" name="Text 6"/>
-            <p:cNvSpPr/>
-            <p:nvPr/>
-          </p:nvSpPr>
-          <p:spPr>
-            <a:xfrm>
-              <a:off x="10625485" y="6456350"/>
-              <a:ext cx="3860915" cy="1135813"/>
-            </a:xfrm>
-            <a:prstGeom prst="rect">
-              <a:avLst/>
-            </a:prstGeom>
-            <a:noFill/>
-            <a:ln/>
-          </p:spPr>
-          <p:txBody>
-            <a:bodyPr wrap="none" rtlCol="0" anchor="t"/>
-            <a:lstStyle/>
-            <a:p>
-              <a:pPr marL="0" indent="0" algn="l">
-                <a:lnSpc>
-                  <a:spcPct val="150000"/>
-                </a:lnSpc>
-                <a:buNone/>
-              </a:pPr>
-              <a:r>
-                <a:rPr lang="zh-CN" altLang="en-US" sz="2800" dirty="0"/>
-                <a:t>何政轩</a:t>
-              </a:r>
-              <a:r>
-                <a:rPr lang="en-US" altLang="zh-CN" sz="2800" dirty="0"/>
-                <a:t>	</a:t>
-              </a:r>
-              <a:r>
-                <a:rPr lang="zh-CN" altLang="en-US" sz="2800" dirty="0"/>
-                <a:t>张骞阳</a:t>
-              </a:r>
-              <a:r>
-                <a:rPr lang="en-US" altLang="zh-CN" sz="2800" dirty="0"/>
-                <a:t>	</a:t>
-              </a:r>
-              <a:r>
-                <a:rPr lang="zh-CN" altLang="en-US" sz="2800" dirty="0"/>
-                <a:t>宁洪斌</a:t>
-              </a:r>
-              <a:r>
-                <a:rPr lang="en-US" altLang="zh-CN" sz="2800" dirty="0"/>
-                <a:t>	</a:t>
-              </a:r>
-              <a:r>
-                <a:rPr lang="zh-CN" altLang="en-US" sz="2800" dirty="0"/>
-                <a:t>崔嘉毅</a:t>
-              </a:r>
-              <a:endParaRPr lang="en-US" altLang="zh-CN" sz="2800" dirty="0"/>
-            </a:p>
-            <a:p>
-              <a:pPr marL="0" indent="0" algn="l">
-                <a:lnSpc>
-                  <a:spcPct val="150000"/>
-                </a:lnSpc>
-                <a:buNone/>
-              </a:pPr>
-              <a:r>
-                <a:rPr lang="zh-CN" altLang="en-US" sz="2800" dirty="0"/>
-                <a:t>周宣丞</a:t>
-              </a:r>
-              <a:r>
-                <a:rPr lang="en-US" altLang="zh-CN" sz="2800" dirty="0"/>
-                <a:t>	</a:t>
-              </a:r>
-              <a:r>
-                <a:rPr lang="zh-CN" altLang="en-US" sz="2800" dirty="0"/>
-                <a:t>李端宸</a:t>
-              </a:r>
-              <a:r>
-                <a:rPr lang="en-US" altLang="zh-CN" sz="2800" dirty="0"/>
-                <a:t>	</a:t>
-              </a:r>
-              <a:r>
-                <a:rPr lang="zh-CN" altLang="en-US" sz="2800" dirty="0"/>
-                <a:t>张维烔</a:t>
-              </a:r>
-              <a:r>
-                <a:rPr lang="en-US" altLang="zh-CN" sz="2800" dirty="0"/>
-                <a:t>	</a:t>
-              </a:r>
-              <a:r>
-                <a:rPr lang="zh-CN" altLang="en-US" sz="2800" dirty="0"/>
-                <a:t>刘    羽</a:t>
-              </a:r>
-              <a:endParaRPr lang="en-US" altLang="zh-CN" sz="2800" dirty="0"/>
-            </a:p>
-            <a:p>
-              <a:pPr marL="0" indent="0" algn="l">
-                <a:lnSpc>
-                  <a:spcPts val="2786"/>
-                </a:lnSpc>
-                <a:buNone/>
-              </a:pPr>
-              <a:endParaRPr lang="en-US" altLang="zh-CN" sz="2800" dirty="0"/>
-            </a:p>
-            <a:p>
-              <a:pPr marL="0" indent="0" algn="l">
-                <a:lnSpc>
-                  <a:spcPts val="2786"/>
-                </a:lnSpc>
-                <a:buNone/>
-              </a:pPr>
-              <a:r>
-                <a:rPr lang="en-US" altLang="zh-CN" sz="2800" dirty="0"/>
-                <a:t>					2023/12/18</a:t>
-              </a:r>
-            </a:p>
-          </p:txBody>
-        </p:sp>
-      </p:grpSp>
+          <a:prstGeom prst="rect">
+            <a:avLst/>
+          </a:prstGeom>
+          <a:noFill/>
+          <a:ln/>
+        </p:spPr>
+        <p:txBody>
+          <a:bodyPr wrap="none" rtlCol="0" anchor="t"/>
+          <a:lstStyle/>
+          <a:p>
+            <a:pPr marL="0" indent="0" algn="l">
+              <a:lnSpc>
+                <a:spcPts val="2786"/>
+              </a:lnSpc>
+              <a:buNone/>
+            </a:pPr>
+            <a:endParaRPr lang="en-US" altLang="zh-CN" sz="2800" dirty="0"/>
+          </a:p>
+          <a:p>
+            <a:pPr marL="0" indent="0" algn="l">
+              <a:lnSpc>
+                <a:spcPts val="2786"/>
+              </a:lnSpc>
+              <a:buNone/>
+            </a:pPr>
+            <a:r>
+              <a:rPr lang="en-US" altLang="zh-CN" sz="2800" dirty="0"/>
+              <a:t>					2023/12/18</a:t>
+            </a:r>
+          </a:p>
+        </p:txBody>
+      </p:sp>
       <p:pic>
         <p:nvPicPr>
           <p:cNvPr id="15" name="图片 14">
@@ -7774,190 +7645,55 @@
           </p:txBody>
         </p:sp>
       </p:grpSp>
-      <p:grpSp>
-        <p:nvGrpSpPr>
-          <p:cNvPr id="9" name="组合 8">
+      <p:sp>
+        <p:nvSpPr>
+          <p:cNvPr id="11" name="Text 6">
             <a:extLst>
               <a:ext uri="{FF2B5EF4-FFF2-40B4-BE49-F238E27FC236}">
-                <a16:creationId xmlns:a16="http://schemas.microsoft.com/office/drawing/2014/main" id="{C6FCE35A-4190-429B-9027-5B0F32841985}"/>
+                <a16:creationId xmlns:a16="http://schemas.microsoft.com/office/drawing/2014/main" id="{41037314-A4E7-4554-A446-69EF6BB3E629}"/>
               </a:ext>
             </a:extLst>
           </p:cNvPr>
-          <p:cNvGrpSpPr/>
+          <p:cNvSpPr/>
           <p:nvPr/>
-        </p:nvGrpSpPr>
-        <p:grpSpPr>
+        </p:nvSpPr>
+        <p:spPr>
           <a:xfrm>
-            <a:off x="9239383" y="6073089"/>
-            <a:ext cx="4276724" cy="1070661"/>
-            <a:chOff x="10146380" y="6456350"/>
-            <a:chExt cx="4340020" cy="1135813"/>
+            <a:off x="9711501" y="6073089"/>
+            <a:ext cx="3804606" cy="1070661"/>
           </a:xfrm>
-        </p:grpSpPr>
-        <p:sp>
-          <p:nvSpPr>
-            <p:cNvPr id="10" name="Shape 4">
-              <a:extLst>
-                <a:ext uri="{FF2B5EF4-FFF2-40B4-BE49-F238E27FC236}">
-                  <a16:creationId xmlns:a16="http://schemas.microsoft.com/office/drawing/2014/main" id="{093A8C9C-121B-4EA1-80F0-DDC15C1FFEF3}"/>
-                </a:ext>
-              </a:extLst>
-            </p:cNvPr>
-            <p:cNvSpPr/>
-            <p:nvPr/>
-          </p:nvSpPr>
-          <p:spPr>
-            <a:xfrm>
-              <a:off x="10146380" y="6702248"/>
-              <a:ext cx="323493" cy="323493"/>
-            </a:xfrm>
-            <a:prstGeom prst="roundRect">
-              <a:avLst>
-                <a:gd name="adj" fmla="val 28263627"/>
-              </a:avLst>
-            </a:prstGeom>
-            <a:solidFill>
-              <a:srgbClr val="BA18DE"/>
-            </a:solidFill>
-            <a:ln w="7620">
-              <a:solidFill>
-                <a:srgbClr val="FFFFFF"/>
-              </a:solidFill>
-              <a:prstDash val="solid"/>
-            </a:ln>
-          </p:spPr>
-          <p:txBody>
-            <a:bodyPr/>
-            <a:lstStyle/>
-            <a:p>
-              <a:endParaRPr lang="zh-CN" altLang="en-US" dirty="0"/>
-            </a:p>
-          </p:txBody>
-        </p:sp>
-        <p:sp>
-          <p:nvSpPr>
-            <p:cNvPr id="11" name="Text 6">
-              <a:extLst>
-                <a:ext uri="{FF2B5EF4-FFF2-40B4-BE49-F238E27FC236}">
-                  <a16:creationId xmlns:a16="http://schemas.microsoft.com/office/drawing/2014/main" id="{41037314-A4E7-4554-A446-69EF6BB3E629}"/>
-                </a:ext>
-              </a:extLst>
-            </p:cNvPr>
-            <p:cNvSpPr/>
-            <p:nvPr/>
-          </p:nvSpPr>
-          <p:spPr>
-            <a:xfrm>
-              <a:off x="10625485" y="6456350"/>
-              <a:ext cx="3860915" cy="1135813"/>
-            </a:xfrm>
-            <a:prstGeom prst="rect">
-              <a:avLst/>
-            </a:prstGeom>
-            <a:noFill/>
-            <a:ln/>
-          </p:spPr>
-          <p:txBody>
-            <a:bodyPr wrap="none" rtlCol="0" anchor="t"/>
-            <a:lstStyle/>
-            <a:p>
-              <a:pPr marL="0" indent="0" algn="l">
-                <a:lnSpc>
-                  <a:spcPct val="150000"/>
-                </a:lnSpc>
-                <a:buNone/>
-              </a:pPr>
-              <a:r>
-                <a:rPr lang="zh-CN" altLang="en-US" sz="2800" dirty="0"/>
-                <a:t>何政轩</a:t>
-              </a:r>
-              <a:r>
-                <a:rPr lang="en-US" altLang="zh-CN" sz="2800" dirty="0"/>
-                <a:t>  </a:t>
-              </a:r>
-              <a:r>
-                <a:rPr lang="zh-CN" altLang="en-US" sz="2800" dirty="0"/>
-                <a:t>张骞阳</a:t>
-              </a:r>
-              <a:r>
-                <a:rPr lang="en-US" altLang="zh-CN" sz="2800" dirty="0"/>
-                <a:t>  </a:t>
-              </a:r>
-              <a:r>
-                <a:rPr lang="zh-CN" altLang="en-US" sz="2800" dirty="0"/>
-                <a:t>宁洪斌</a:t>
-              </a:r>
-              <a:r>
-                <a:rPr lang="en-US" altLang="zh-CN" sz="2800" dirty="0"/>
-                <a:t>	</a:t>
-              </a:r>
-              <a:r>
-                <a:rPr lang="zh-CN" altLang="en-US" sz="2800" dirty="0"/>
-                <a:t>崔嘉毅</a:t>
-              </a:r>
-              <a:endParaRPr lang="en-US" altLang="zh-CN" sz="2800" dirty="0"/>
-            </a:p>
-            <a:p>
-              <a:pPr marL="0" indent="0" algn="l">
-                <a:lnSpc>
-                  <a:spcPct val="150000"/>
-                </a:lnSpc>
-                <a:buNone/>
-              </a:pPr>
-              <a:r>
-                <a:rPr lang="zh-CN" altLang="en-US" sz="2800" dirty="0"/>
-                <a:t>周宣丞</a:t>
-              </a:r>
-              <a:r>
-                <a:rPr lang="en-US" altLang="zh-CN" sz="2800" dirty="0"/>
-                <a:t>  </a:t>
-              </a:r>
-              <a:r>
-                <a:rPr lang="zh-CN" altLang="en-US" sz="2800" dirty="0"/>
-                <a:t>李端宸</a:t>
-              </a:r>
-              <a:r>
-                <a:rPr lang="en-US" altLang="zh-CN" sz="2800" dirty="0"/>
-                <a:t>  </a:t>
-              </a:r>
-              <a:r>
-                <a:rPr lang="zh-CN" altLang="en-US" sz="2800" dirty="0"/>
-                <a:t>张维烔</a:t>
-              </a:r>
-              <a:r>
-                <a:rPr lang="en-US" altLang="zh-CN" sz="2800" dirty="0"/>
-                <a:t>	</a:t>
-              </a:r>
-              <a:r>
-                <a:rPr lang="zh-CN" altLang="en-US" sz="2800" dirty="0"/>
-                <a:t>刘    羽</a:t>
-              </a:r>
-              <a:endParaRPr lang="en-US" altLang="zh-CN" sz="2800" dirty="0"/>
-            </a:p>
-            <a:p>
-              <a:pPr marL="0" indent="0" algn="l">
-                <a:lnSpc>
-                  <a:spcPts val="2786"/>
-                </a:lnSpc>
-                <a:buNone/>
-              </a:pPr>
-              <a:endParaRPr lang="en-US" altLang="zh-CN" sz="2800" dirty="0"/>
-            </a:p>
-            <a:p>
-              <a:pPr marL="0" indent="0" algn="l">
-                <a:lnSpc>
-                  <a:spcPts val="2786"/>
-                </a:lnSpc>
-                <a:buNone/>
-              </a:pPr>
-              <a:r>
-                <a:rPr lang="en-US" altLang="zh-CN" sz="2800" dirty="0"/>
-                <a:t>			2023/12/18</a:t>
-              </a:r>
-            </a:p>
-          </p:txBody>
-        </p:sp>
-      </p:grpSp>
+          <a:prstGeom prst="rect">
+            <a:avLst/>
+          </a:prstGeom>
+          <a:noFill/>
+          <a:ln/>
+        </p:spPr>
+        <p:txBody>
+          <a:bodyPr wrap="none" rtlCol="0" anchor="t"/>
+          <a:lstStyle/>
+          <a:p>
+            <a:pPr marL="0" indent="0" algn="l">
+              <a:lnSpc>
+                <a:spcPts val="2786"/>
+              </a:lnSpc>
+              <a:buNone/>
+            </a:pPr>
+            <a:endParaRPr lang="en-US" altLang="zh-CN" sz="2800" dirty="0"/>
+          </a:p>
+          <a:p>
+            <a:pPr marL="0" indent="0" algn="l">
+              <a:lnSpc>
+                <a:spcPts val="2786"/>
+              </a:lnSpc>
+              <a:buNone/>
+            </a:pPr>
+            <a:r>
+              <a:rPr lang="en-US" altLang="zh-CN" sz="2800" dirty="0"/>
+              <a:t>			2023/12/18</a:t>
+            </a:r>
+          </a:p>
+        </p:txBody>
+      </p:sp>
       <p:pic>
         <p:nvPicPr>
           <p:cNvPr id="7" name="图片 6">

</xml_diff>

<commit_message>
Site updated: 2024-05-28 16:29:00
</commit_message>
<xml_diff>
--- a/ppt/mentalhealth/202312180.pptx
+++ b/ppt/mentalhealth/202312180.pptx
@@ -1334,49 +1334,178 @@
           </a:p>
         </p:txBody>
       </p:sp>
-      <p:sp>
-        <p:nvSpPr>
-          <p:cNvPr id="9" name="Text 6"/>
-          <p:cNvSpPr/>
+      <p:grpSp>
+        <p:nvGrpSpPr>
+          <p:cNvPr id="18" name="组合 17">
+            <a:extLst>
+              <a:ext uri="{FF2B5EF4-FFF2-40B4-BE49-F238E27FC236}">
+                <a16:creationId xmlns:a16="http://schemas.microsoft.com/office/drawing/2014/main" id="{92B8D15E-6D50-4949-A315-6132F7550089}"/>
+              </a:ext>
+            </a:extLst>
+          </p:cNvPr>
+          <p:cNvGrpSpPr/>
           <p:nvPr/>
-        </p:nvSpPr>
-        <p:spPr>
+        </p:nvGrpSpPr>
+        <p:grpSpPr>
           <a:xfrm>
-            <a:off x="7475873" y="5958840"/>
-            <a:ext cx="3677904" cy="1293495"/>
+            <a:off x="7019478" y="5958840"/>
+            <a:ext cx="4134299" cy="1293495"/>
+            <a:chOff x="10146380" y="6456350"/>
+            <a:chExt cx="4340020" cy="1135813"/>
           </a:xfrm>
-          <a:prstGeom prst="rect">
-            <a:avLst/>
-          </a:prstGeom>
-          <a:noFill/>
-          <a:ln/>
-        </p:spPr>
-        <p:txBody>
-          <a:bodyPr wrap="none" rtlCol="0" anchor="t"/>
-          <a:lstStyle/>
-          <a:p>
-            <a:pPr marL="0" indent="0" algn="l">
-              <a:lnSpc>
-                <a:spcPts val="2786"/>
-              </a:lnSpc>
-              <a:buNone/>
-            </a:pPr>
-            <a:endParaRPr lang="en-US" altLang="zh-CN" sz="2800" dirty="0"/>
-          </a:p>
-          <a:p>
-            <a:pPr marL="0" indent="0" algn="l">
-              <a:lnSpc>
-                <a:spcPts val="2786"/>
-              </a:lnSpc>
-              <a:buNone/>
-            </a:pPr>
-            <a:r>
-              <a:rPr lang="en-US" altLang="zh-CN" sz="2800" dirty="0"/>
-              <a:t>					2023/12/18</a:t>
-            </a:r>
-          </a:p>
-        </p:txBody>
-      </p:sp>
+        </p:grpSpPr>
+        <p:sp>
+          <p:nvSpPr>
+            <p:cNvPr id="7" name="Shape 4"/>
+            <p:cNvSpPr/>
+            <p:nvPr/>
+          </p:nvSpPr>
+          <p:spPr>
+            <a:xfrm>
+              <a:off x="10146380" y="6702248"/>
+              <a:ext cx="323493" cy="323493"/>
+            </a:xfrm>
+            <a:prstGeom prst="roundRect">
+              <a:avLst>
+                <a:gd name="adj" fmla="val 28263627"/>
+              </a:avLst>
+            </a:prstGeom>
+            <a:solidFill>
+              <a:srgbClr val="BA18DE"/>
+            </a:solidFill>
+            <a:ln w="7620">
+              <a:solidFill>
+                <a:srgbClr val="FFFFFF"/>
+              </a:solidFill>
+              <a:prstDash val="solid"/>
+            </a:ln>
+          </p:spPr>
+          <p:txBody>
+            <a:bodyPr/>
+            <a:lstStyle/>
+            <a:p>
+              <a:endParaRPr lang="zh-CN" altLang="en-US" dirty="0"/>
+            </a:p>
+          </p:txBody>
+        </p:sp>
+        <p:sp>
+          <p:nvSpPr>
+            <p:cNvPr id="9" name="Text 6"/>
+            <p:cNvSpPr/>
+            <p:nvPr/>
+          </p:nvSpPr>
+          <p:spPr>
+            <a:xfrm>
+              <a:off x="10625485" y="6456350"/>
+              <a:ext cx="3860915" cy="1135813"/>
+            </a:xfrm>
+            <a:prstGeom prst="rect">
+              <a:avLst/>
+            </a:prstGeom>
+            <a:noFill/>
+            <a:ln/>
+          </p:spPr>
+          <p:txBody>
+            <a:bodyPr wrap="none" rtlCol="0" anchor="t"/>
+            <a:lstStyle/>
+            <a:p>
+              <a:pPr marL="0" indent="0" algn="l">
+                <a:lnSpc>
+                  <a:spcPct val="150000"/>
+                </a:lnSpc>
+                <a:buNone/>
+              </a:pPr>
+              <a:r>
+                <a:rPr lang="zh-CN" altLang="en-US" sz="2800" dirty="0"/>
+                <a:t>何政轩</a:t>
+              </a:r>
+              <a:r>
+                <a:rPr lang="en-US" altLang="zh-CN" sz="2800" dirty="0"/>
+                <a:t>	</a:t>
+              </a:r>
+              <a:r>
+                <a:rPr lang="zh-CN" altLang="en-US" sz="2800" dirty="0"/>
+                <a:t>张骞阳</a:t>
+              </a:r>
+              <a:r>
+                <a:rPr lang="en-US" altLang="zh-CN" sz="2800" dirty="0"/>
+                <a:t>	</a:t>
+              </a:r>
+              <a:r>
+                <a:rPr lang="zh-CN" altLang="en-US" sz="2800" dirty="0"/>
+                <a:t>宁洪斌</a:t>
+              </a:r>
+              <a:r>
+                <a:rPr lang="en-US" altLang="zh-CN" sz="2800" dirty="0"/>
+                <a:t>	</a:t>
+              </a:r>
+              <a:r>
+                <a:rPr lang="zh-CN" altLang="en-US" sz="2800" dirty="0"/>
+                <a:t>崔嘉毅</a:t>
+              </a:r>
+              <a:endParaRPr lang="en-US" altLang="zh-CN" sz="2800" dirty="0"/>
+            </a:p>
+            <a:p>
+              <a:pPr marL="0" indent="0" algn="l">
+                <a:lnSpc>
+                  <a:spcPct val="150000"/>
+                </a:lnSpc>
+                <a:buNone/>
+              </a:pPr>
+              <a:r>
+                <a:rPr lang="zh-CN" altLang="en-US" sz="2800" dirty="0"/>
+                <a:t>周宣丞</a:t>
+              </a:r>
+              <a:r>
+                <a:rPr lang="en-US" altLang="zh-CN" sz="2800" dirty="0"/>
+                <a:t>	</a:t>
+              </a:r>
+              <a:r>
+                <a:rPr lang="zh-CN" altLang="en-US" sz="2800" dirty="0"/>
+                <a:t>李端宸</a:t>
+              </a:r>
+              <a:r>
+                <a:rPr lang="en-US" altLang="zh-CN" sz="2800" dirty="0"/>
+                <a:t>	</a:t>
+              </a:r>
+              <a:r>
+                <a:rPr lang="zh-CN" altLang="en-US" sz="2800" dirty="0"/>
+                <a:t>张维烔</a:t>
+              </a:r>
+              <a:r>
+                <a:rPr lang="en-US" altLang="zh-CN" sz="2800" dirty="0"/>
+                <a:t>	</a:t>
+              </a:r>
+              <a:r>
+                <a:rPr lang="zh-CN" altLang="en-US" sz="2800" dirty="0"/>
+                <a:t>刘    羽</a:t>
+              </a:r>
+              <a:endParaRPr lang="en-US" altLang="zh-CN" sz="2800" dirty="0"/>
+            </a:p>
+            <a:p>
+              <a:pPr marL="0" indent="0" algn="l">
+                <a:lnSpc>
+                  <a:spcPts val="2786"/>
+                </a:lnSpc>
+                <a:buNone/>
+              </a:pPr>
+              <a:endParaRPr lang="en-US" altLang="zh-CN" sz="2800" dirty="0"/>
+            </a:p>
+            <a:p>
+              <a:pPr marL="0" indent="0" algn="l">
+                <a:lnSpc>
+                  <a:spcPts val="2786"/>
+                </a:lnSpc>
+                <a:buNone/>
+              </a:pPr>
+              <a:r>
+                <a:rPr lang="en-US" altLang="zh-CN" sz="2800" dirty="0"/>
+                <a:t>					2023/12/18</a:t>
+              </a:r>
+            </a:p>
+          </p:txBody>
+        </p:sp>
+      </p:grpSp>
       <p:pic>
         <p:nvPicPr>
           <p:cNvPr id="15" name="图片 14">
@@ -7645,55 +7774,190 @@
           </p:txBody>
         </p:sp>
       </p:grpSp>
-      <p:sp>
-        <p:nvSpPr>
-          <p:cNvPr id="11" name="Text 6">
+      <p:grpSp>
+        <p:nvGrpSpPr>
+          <p:cNvPr id="9" name="组合 8">
             <a:extLst>
               <a:ext uri="{FF2B5EF4-FFF2-40B4-BE49-F238E27FC236}">
-                <a16:creationId xmlns:a16="http://schemas.microsoft.com/office/drawing/2014/main" id="{41037314-A4E7-4554-A446-69EF6BB3E629}"/>
+                <a16:creationId xmlns:a16="http://schemas.microsoft.com/office/drawing/2014/main" id="{C6FCE35A-4190-429B-9027-5B0F32841985}"/>
               </a:ext>
             </a:extLst>
           </p:cNvPr>
-          <p:cNvSpPr/>
+          <p:cNvGrpSpPr/>
           <p:nvPr/>
-        </p:nvSpPr>
-        <p:spPr>
+        </p:nvGrpSpPr>
+        <p:grpSpPr>
           <a:xfrm>
-            <a:off x="9711501" y="6073089"/>
-            <a:ext cx="3804606" cy="1070661"/>
+            <a:off x="9239383" y="6073089"/>
+            <a:ext cx="4276724" cy="1070661"/>
+            <a:chOff x="10146380" y="6456350"/>
+            <a:chExt cx="4340020" cy="1135813"/>
           </a:xfrm>
-          <a:prstGeom prst="rect">
-            <a:avLst/>
-          </a:prstGeom>
-          <a:noFill/>
-          <a:ln/>
-        </p:spPr>
-        <p:txBody>
-          <a:bodyPr wrap="none" rtlCol="0" anchor="t"/>
-          <a:lstStyle/>
-          <a:p>
-            <a:pPr marL="0" indent="0" algn="l">
-              <a:lnSpc>
-                <a:spcPts val="2786"/>
-              </a:lnSpc>
-              <a:buNone/>
-            </a:pPr>
-            <a:endParaRPr lang="en-US" altLang="zh-CN" sz="2800" dirty="0"/>
-          </a:p>
-          <a:p>
-            <a:pPr marL="0" indent="0" algn="l">
-              <a:lnSpc>
-                <a:spcPts val="2786"/>
-              </a:lnSpc>
-              <a:buNone/>
-            </a:pPr>
-            <a:r>
-              <a:rPr lang="en-US" altLang="zh-CN" sz="2800" dirty="0"/>
-              <a:t>			2023/12/18</a:t>
-            </a:r>
-          </a:p>
-        </p:txBody>
-      </p:sp>
+        </p:grpSpPr>
+        <p:sp>
+          <p:nvSpPr>
+            <p:cNvPr id="10" name="Shape 4">
+              <a:extLst>
+                <a:ext uri="{FF2B5EF4-FFF2-40B4-BE49-F238E27FC236}">
+                  <a16:creationId xmlns:a16="http://schemas.microsoft.com/office/drawing/2014/main" id="{093A8C9C-121B-4EA1-80F0-DDC15C1FFEF3}"/>
+                </a:ext>
+              </a:extLst>
+            </p:cNvPr>
+            <p:cNvSpPr/>
+            <p:nvPr/>
+          </p:nvSpPr>
+          <p:spPr>
+            <a:xfrm>
+              <a:off x="10146380" y="6702248"/>
+              <a:ext cx="323493" cy="323493"/>
+            </a:xfrm>
+            <a:prstGeom prst="roundRect">
+              <a:avLst>
+                <a:gd name="adj" fmla="val 28263627"/>
+              </a:avLst>
+            </a:prstGeom>
+            <a:solidFill>
+              <a:srgbClr val="BA18DE"/>
+            </a:solidFill>
+            <a:ln w="7620">
+              <a:solidFill>
+                <a:srgbClr val="FFFFFF"/>
+              </a:solidFill>
+              <a:prstDash val="solid"/>
+            </a:ln>
+          </p:spPr>
+          <p:txBody>
+            <a:bodyPr/>
+            <a:lstStyle/>
+            <a:p>
+              <a:endParaRPr lang="zh-CN" altLang="en-US" dirty="0"/>
+            </a:p>
+          </p:txBody>
+        </p:sp>
+        <p:sp>
+          <p:nvSpPr>
+            <p:cNvPr id="11" name="Text 6">
+              <a:extLst>
+                <a:ext uri="{FF2B5EF4-FFF2-40B4-BE49-F238E27FC236}">
+                  <a16:creationId xmlns:a16="http://schemas.microsoft.com/office/drawing/2014/main" id="{41037314-A4E7-4554-A446-69EF6BB3E629}"/>
+                </a:ext>
+              </a:extLst>
+            </p:cNvPr>
+            <p:cNvSpPr/>
+            <p:nvPr/>
+          </p:nvSpPr>
+          <p:spPr>
+            <a:xfrm>
+              <a:off x="10625485" y="6456350"/>
+              <a:ext cx="3860915" cy="1135813"/>
+            </a:xfrm>
+            <a:prstGeom prst="rect">
+              <a:avLst/>
+            </a:prstGeom>
+            <a:noFill/>
+            <a:ln/>
+          </p:spPr>
+          <p:txBody>
+            <a:bodyPr wrap="none" rtlCol="0" anchor="t"/>
+            <a:lstStyle/>
+            <a:p>
+              <a:pPr marL="0" indent="0" algn="l">
+                <a:lnSpc>
+                  <a:spcPct val="150000"/>
+                </a:lnSpc>
+                <a:buNone/>
+              </a:pPr>
+              <a:r>
+                <a:rPr lang="zh-CN" altLang="en-US" sz="2800" dirty="0"/>
+                <a:t>何政轩</a:t>
+              </a:r>
+              <a:r>
+                <a:rPr lang="en-US" altLang="zh-CN" sz="2800" dirty="0"/>
+                <a:t>  </a:t>
+              </a:r>
+              <a:r>
+                <a:rPr lang="zh-CN" altLang="en-US" sz="2800" dirty="0"/>
+                <a:t>张骞阳</a:t>
+              </a:r>
+              <a:r>
+                <a:rPr lang="en-US" altLang="zh-CN" sz="2800" dirty="0"/>
+                <a:t>  </a:t>
+              </a:r>
+              <a:r>
+                <a:rPr lang="zh-CN" altLang="en-US" sz="2800" dirty="0"/>
+                <a:t>宁洪斌</a:t>
+              </a:r>
+              <a:r>
+                <a:rPr lang="en-US" altLang="zh-CN" sz="2800" dirty="0"/>
+                <a:t>	</a:t>
+              </a:r>
+              <a:r>
+                <a:rPr lang="zh-CN" altLang="en-US" sz="2800" dirty="0"/>
+                <a:t>崔嘉毅</a:t>
+              </a:r>
+              <a:endParaRPr lang="en-US" altLang="zh-CN" sz="2800" dirty="0"/>
+            </a:p>
+            <a:p>
+              <a:pPr marL="0" indent="0" algn="l">
+                <a:lnSpc>
+                  <a:spcPct val="150000"/>
+                </a:lnSpc>
+                <a:buNone/>
+              </a:pPr>
+              <a:r>
+                <a:rPr lang="zh-CN" altLang="en-US" sz="2800" dirty="0"/>
+                <a:t>周宣丞</a:t>
+              </a:r>
+              <a:r>
+                <a:rPr lang="en-US" altLang="zh-CN" sz="2800" dirty="0"/>
+                <a:t>  </a:t>
+              </a:r>
+              <a:r>
+                <a:rPr lang="zh-CN" altLang="en-US" sz="2800" dirty="0"/>
+                <a:t>李端宸</a:t>
+              </a:r>
+              <a:r>
+                <a:rPr lang="en-US" altLang="zh-CN" sz="2800" dirty="0"/>
+                <a:t>  </a:t>
+              </a:r>
+              <a:r>
+                <a:rPr lang="zh-CN" altLang="en-US" sz="2800" dirty="0"/>
+                <a:t>张维烔</a:t>
+              </a:r>
+              <a:r>
+                <a:rPr lang="en-US" altLang="zh-CN" sz="2800" dirty="0"/>
+                <a:t>	</a:t>
+              </a:r>
+              <a:r>
+                <a:rPr lang="zh-CN" altLang="en-US" sz="2800" dirty="0"/>
+                <a:t>刘    羽</a:t>
+              </a:r>
+              <a:endParaRPr lang="en-US" altLang="zh-CN" sz="2800" dirty="0"/>
+            </a:p>
+            <a:p>
+              <a:pPr marL="0" indent="0" algn="l">
+                <a:lnSpc>
+                  <a:spcPts val="2786"/>
+                </a:lnSpc>
+                <a:buNone/>
+              </a:pPr>
+              <a:endParaRPr lang="en-US" altLang="zh-CN" sz="2800" dirty="0"/>
+            </a:p>
+            <a:p>
+              <a:pPr marL="0" indent="0" algn="l">
+                <a:lnSpc>
+                  <a:spcPts val="2786"/>
+                </a:lnSpc>
+                <a:buNone/>
+              </a:pPr>
+              <a:r>
+                <a:rPr lang="en-US" altLang="zh-CN" sz="2800" dirty="0"/>
+                <a:t>			2023/12/18</a:t>
+              </a:r>
+            </a:p>
+          </p:txBody>
+        </p:sp>
+      </p:grpSp>
       <p:pic>
         <p:nvPicPr>
           <p:cNvPr id="7" name="图片 6">

</xml_diff>